<commit_message>
Fix some issue with presentation
</commit_message>
<xml_diff>
--- a/Pres.pptx
+++ b/Pres.pptx
@@ -240,7 +240,7 @@
           <a:p>
             <a:fld id="{7E581BF8-B314-4AF7-8C47-92D1FDF491BC}" type="datetimeFigureOut">
               <a:rPr lang="zh-CN" altLang="en-US" smtClean="0"/>
-              <a:t>2018/12/2</a:t>
+              <a:t>2018/12/3</a:t>
             </a:fld>
             <a:endParaRPr lang="zh-CN" altLang="en-US"/>
           </a:p>
@@ -304,38 +304,37 @@
           <a:p>
             <a:pPr lvl="0"/>
             <a:r>
-              <a:rPr lang="zh-CN" altLang="en-US" smtClean="0"/>
+              <a:rPr lang="zh-CN" altLang="en-US"/>
               <a:t>编辑母版文本样式</a:t>
             </a:r>
           </a:p>
           <a:p>
             <a:pPr lvl="1"/>
             <a:r>
-              <a:rPr lang="zh-CN" altLang="en-US" smtClean="0"/>
+              <a:rPr lang="zh-CN" altLang="en-US"/>
               <a:t>第二级</a:t>
             </a:r>
           </a:p>
           <a:p>
             <a:pPr lvl="2"/>
             <a:r>
-              <a:rPr lang="zh-CN" altLang="en-US" smtClean="0"/>
+              <a:rPr lang="zh-CN" altLang="en-US"/>
               <a:t>第三级</a:t>
             </a:r>
           </a:p>
           <a:p>
             <a:pPr lvl="3"/>
             <a:r>
-              <a:rPr lang="zh-CN" altLang="en-US" smtClean="0"/>
+              <a:rPr lang="zh-CN" altLang="en-US"/>
               <a:t>第四级</a:t>
             </a:r>
           </a:p>
           <a:p>
             <a:pPr lvl="4"/>
             <a:r>
-              <a:rPr lang="zh-CN" altLang="en-US" smtClean="0"/>
+              <a:rPr lang="zh-CN" altLang="en-US"/>
               <a:t>第五级</a:t>
             </a:r>
-            <a:endParaRPr lang="zh-CN" altLang="en-US"/>
           </a:p>
         </p:txBody>
       </p:sp>
@@ -550,7 +549,7 @@
           </a:lstStyle>
           <a:p>
             <a:r>
-              <a:rPr lang="en-US" smtClean="0"/>
+              <a:rPr lang="en-US"/>
               <a:t>Click to edit Master title style</a:t>
             </a:r>
             <a:endParaRPr lang="en-US" dirty="0"/>
@@ -615,7 +614,7 @@
           </a:lstStyle>
           <a:p>
             <a:r>
-              <a:rPr lang="en-US" smtClean="0"/>
+              <a:rPr lang="en-US"/>
               <a:t>Click to edit Master subtitle style</a:t>
             </a:r>
             <a:endParaRPr lang="en-US" dirty="0"/>
@@ -646,7 +645,7 @@
             </a:pPr>
             <a:fld id="{0256F1F2-3215-4EB1-97B3-4FA40441AD7D}" type="datetime1">
               <a:rPr lang="en-US" altLang="zh-CN" smtClean="0"/>
-              <a:t>12/2/2018</a:t>
+              <a:t>12/3/2018</a:t>
             </a:fld>
             <a:endParaRPr lang="en-US"/>
           </a:p>
@@ -675,10 +674,9 @@
               <a:defRPr/>
             </a:pPr>
             <a:r>
-              <a:rPr lang="en-US" smtClean="0"/>
+              <a:rPr lang="en-US"/>
               <a:t>3D Trajactory Representation for Understanding Human Actions</a:t>
             </a:r>
-            <a:endParaRPr lang="en-US"/>
           </a:p>
         </p:txBody>
       </p:sp>
@@ -756,7 +754,7 @@
           <a:lstStyle/>
           <a:p>
             <a:r>
-              <a:rPr lang="en-US" smtClean="0"/>
+              <a:rPr lang="en-US"/>
               <a:t>Click to edit Master title style</a:t>
             </a:r>
             <a:endParaRPr lang="en-US" dirty="0"/>
@@ -780,35 +778,35 @@
           <a:p>
             <a:pPr lvl="0"/>
             <a:r>
-              <a:rPr lang="en-US" smtClean="0"/>
+              <a:rPr lang="en-US"/>
               <a:t>Click to edit Master text styles</a:t>
             </a:r>
           </a:p>
           <a:p>
             <a:pPr lvl="1"/>
             <a:r>
-              <a:rPr lang="en-US" smtClean="0"/>
+              <a:rPr lang="en-US"/>
               <a:t>Second level</a:t>
             </a:r>
           </a:p>
           <a:p>
             <a:pPr lvl="2"/>
             <a:r>
-              <a:rPr lang="en-US" smtClean="0"/>
+              <a:rPr lang="en-US"/>
               <a:t>Third level</a:t>
             </a:r>
           </a:p>
           <a:p>
             <a:pPr lvl="3"/>
             <a:r>
-              <a:rPr lang="en-US" smtClean="0"/>
+              <a:rPr lang="en-US"/>
               <a:t>Fourth level</a:t>
             </a:r>
           </a:p>
           <a:p>
             <a:pPr lvl="4"/>
             <a:r>
-              <a:rPr lang="en-US" smtClean="0"/>
+              <a:rPr lang="en-US"/>
               <a:t>Fifth level</a:t>
             </a:r>
             <a:endParaRPr lang="en-US" dirty="0"/>
@@ -839,7 +837,7 @@
             </a:pPr>
             <a:fld id="{A83F55A7-9D3D-4E14-A1D2-93E2063CFC84}" type="datetime1">
               <a:rPr lang="en-US" altLang="zh-CN" smtClean="0"/>
-              <a:t>12/2/2018</a:t>
+              <a:t>12/3/2018</a:t>
             </a:fld>
             <a:endParaRPr lang="en-US"/>
           </a:p>
@@ -868,10 +866,9 @@
               <a:defRPr/>
             </a:pPr>
             <a:r>
-              <a:rPr lang="en-US" smtClean="0"/>
+              <a:rPr lang="en-US"/>
               <a:t>3D Trajactory Representation for Understanding Human Actions</a:t>
             </a:r>
-            <a:endParaRPr lang="en-US"/>
           </a:p>
         </p:txBody>
       </p:sp>
@@ -954,7 +951,7 @@
           <a:lstStyle/>
           <a:p>
             <a:r>
-              <a:rPr lang="en-US" smtClean="0"/>
+              <a:rPr lang="en-US"/>
               <a:t>Click to edit Master title style</a:t>
             </a:r>
             <a:endParaRPr lang="en-US" dirty="0"/>
@@ -983,35 +980,35 @@
           <a:p>
             <a:pPr lvl="0"/>
             <a:r>
-              <a:rPr lang="en-US" smtClean="0"/>
+              <a:rPr lang="en-US"/>
               <a:t>Click to edit Master text styles</a:t>
             </a:r>
           </a:p>
           <a:p>
             <a:pPr lvl="1"/>
             <a:r>
-              <a:rPr lang="en-US" smtClean="0"/>
+              <a:rPr lang="en-US"/>
               <a:t>Second level</a:t>
             </a:r>
           </a:p>
           <a:p>
             <a:pPr lvl="2"/>
             <a:r>
-              <a:rPr lang="en-US" smtClean="0"/>
+              <a:rPr lang="en-US"/>
               <a:t>Third level</a:t>
             </a:r>
           </a:p>
           <a:p>
             <a:pPr lvl="3"/>
             <a:r>
-              <a:rPr lang="en-US" smtClean="0"/>
+              <a:rPr lang="en-US"/>
               <a:t>Fourth level</a:t>
             </a:r>
           </a:p>
           <a:p>
             <a:pPr lvl="4"/>
             <a:r>
-              <a:rPr lang="en-US" smtClean="0"/>
+              <a:rPr lang="en-US"/>
               <a:t>Fifth level</a:t>
             </a:r>
             <a:endParaRPr lang="en-US" dirty="0"/>
@@ -1042,7 +1039,7 @@
             </a:pPr>
             <a:fld id="{29B52B16-5F61-430D-A60B-0F4B47B60DD9}" type="datetime1">
               <a:rPr lang="en-US" altLang="zh-CN" smtClean="0"/>
-              <a:t>12/2/2018</a:t>
+              <a:t>12/3/2018</a:t>
             </a:fld>
             <a:endParaRPr lang="en-US"/>
           </a:p>
@@ -1071,10 +1068,9 @@
               <a:defRPr/>
             </a:pPr>
             <a:r>
-              <a:rPr lang="en-US" smtClean="0"/>
+              <a:rPr lang="en-US"/>
               <a:t>3D Trajactory Representation for Understanding Human Actions</a:t>
             </a:r>
-            <a:endParaRPr lang="en-US"/>
           </a:p>
         </p:txBody>
       </p:sp>
@@ -1152,7 +1148,7 @@
           <a:lstStyle/>
           <a:p>
             <a:r>
-              <a:rPr lang="en-US" smtClean="0"/>
+              <a:rPr lang="en-US"/>
               <a:t>Click to edit Master title style</a:t>
             </a:r>
             <a:endParaRPr lang="en-US" dirty="0"/>
@@ -1176,35 +1172,35 @@
           <a:p>
             <a:pPr lvl="0"/>
             <a:r>
-              <a:rPr lang="en-US" smtClean="0"/>
+              <a:rPr lang="en-US"/>
               <a:t>Click to edit Master text styles</a:t>
             </a:r>
           </a:p>
           <a:p>
             <a:pPr lvl="1"/>
             <a:r>
-              <a:rPr lang="en-US" smtClean="0"/>
+              <a:rPr lang="en-US"/>
               <a:t>Second level</a:t>
             </a:r>
           </a:p>
           <a:p>
             <a:pPr lvl="2"/>
             <a:r>
-              <a:rPr lang="en-US" smtClean="0"/>
+              <a:rPr lang="en-US"/>
               <a:t>Third level</a:t>
             </a:r>
           </a:p>
           <a:p>
             <a:pPr lvl="3"/>
             <a:r>
-              <a:rPr lang="en-US" smtClean="0"/>
+              <a:rPr lang="en-US"/>
               <a:t>Fourth level</a:t>
             </a:r>
           </a:p>
           <a:p>
             <a:pPr lvl="4"/>
             <a:r>
-              <a:rPr lang="en-US" smtClean="0"/>
+              <a:rPr lang="en-US"/>
               <a:t>Fifth level</a:t>
             </a:r>
             <a:endParaRPr lang="en-US" dirty="0"/>
@@ -1235,7 +1231,7 @@
             </a:pPr>
             <a:fld id="{174B98B3-4651-4A51-82F7-0A9B208B0838}" type="datetime1">
               <a:rPr lang="en-US" altLang="zh-CN" smtClean="0"/>
-              <a:t>12/2/2018</a:t>
+              <a:t>12/3/2018</a:t>
             </a:fld>
             <a:endParaRPr lang="en-US"/>
           </a:p>
@@ -1264,10 +1260,9 @@
               <a:defRPr/>
             </a:pPr>
             <a:r>
-              <a:rPr lang="en-US" smtClean="0"/>
+              <a:rPr lang="en-US"/>
               <a:t>3D Trajactory Representation for Understanding Human Actions</a:t>
             </a:r>
-            <a:endParaRPr lang="en-US"/>
           </a:p>
         </p:txBody>
       </p:sp>
@@ -1354,7 +1349,7 @@
           </a:lstStyle>
           <a:p>
             <a:r>
-              <a:rPr lang="en-US" smtClean="0"/>
+              <a:rPr lang="en-US"/>
               <a:t>Click to edit Master title style</a:t>
             </a:r>
             <a:endParaRPr lang="en-US" dirty="0"/>
@@ -1474,7 +1469,7 @@
           <a:p>
             <a:pPr lvl="0"/>
             <a:r>
-              <a:rPr lang="en-US" smtClean="0"/>
+              <a:rPr lang="en-US"/>
               <a:t>Click to edit Master text styles</a:t>
             </a:r>
           </a:p>
@@ -1504,7 +1499,7 @@
             </a:pPr>
             <a:fld id="{112CABFF-C2EF-41F1-8849-8B1768AE15F5}" type="datetime1">
               <a:rPr lang="en-US" altLang="zh-CN" smtClean="0"/>
-              <a:t>12/2/2018</a:t>
+              <a:t>12/3/2018</a:t>
             </a:fld>
             <a:endParaRPr lang="en-US"/>
           </a:p>
@@ -1533,10 +1528,9 @@
               <a:defRPr/>
             </a:pPr>
             <a:r>
-              <a:rPr lang="en-US" smtClean="0"/>
+              <a:rPr lang="en-US"/>
               <a:t>3D Trajactory Representation for Understanding Human Actions</a:t>
             </a:r>
-            <a:endParaRPr lang="en-US"/>
           </a:p>
         </p:txBody>
       </p:sp>
@@ -1614,7 +1608,7 @@
           <a:lstStyle/>
           <a:p>
             <a:r>
-              <a:rPr lang="en-US" smtClean="0"/>
+              <a:rPr lang="en-US"/>
               <a:t>Click to edit Master title style</a:t>
             </a:r>
             <a:endParaRPr lang="en-US" dirty="0"/>
@@ -1643,35 +1637,35 @@
           <a:p>
             <a:pPr lvl="0"/>
             <a:r>
-              <a:rPr lang="en-US" smtClean="0"/>
+              <a:rPr lang="en-US"/>
               <a:t>Click to edit Master text styles</a:t>
             </a:r>
           </a:p>
           <a:p>
             <a:pPr lvl="1"/>
             <a:r>
-              <a:rPr lang="en-US" smtClean="0"/>
+              <a:rPr lang="en-US"/>
               <a:t>Second level</a:t>
             </a:r>
           </a:p>
           <a:p>
             <a:pPr lvl="2"/>
             <a:r>
-              <a:rPr lang="en-US" smtClean="0"/>
+              <a:rPr lang="en-US"/>
               <a:t>Third level</a:t>
             </a:r>
           </a:p>
           <a:p>
             <a:pPr lvl="3"/>
             <a:r>
-              <a:rPr lang="en-US" smtClean="0"/>
+              <a:rPr lang="en-US"/>
               <a:t>Fourth level</a:t>
             </a:r>
           </a:p>
           <a:p>
             <a:pPr lvl="4"/>
             <a:r>
-              <a:rPr lang="en-US" smtClean="0"/>
+              <a:rPr lang="en-US"/>
               <a:t>Fifth level</a:t>
             </a:r>
             <a:endParaRPr lang="en-US" dirty="0"/>
@@ -1700,35 +1694,35 @@
           <a:p>
             <a:pPr lvl="0"/>
             <a:r>
-              <a:rPr lang="en-US" smtClean="0"/>
+              <a:rPr lang="en-US"/>
               <a:t>Click to edit Master text styles</a:t>
             </a:r>
           </a:p>
           <a:p>
             <a:pPr lvl="1"/>
             <a:r>
-              <a:rPr lang="en-US" smtClean="0"/>
+              <a:rPr lang="en-US"/>
               <a:t>Second level</a:t>
             </a:r>
           </a:p>
           <a:p>
             <a:pPr lvl="2"/>
             <a:r>
-              <a:rPr lang="en-US" smtClean="0"/>
+              <a:rPr lang="en-US"/>
               <a:t>Third level</a:t>
             </a:r>
           </a:p>
           <a:p>
             <a:pPr lvl="3"/>
             <a:r>
-              <a:rPr lang="en-US" smtClean="0"/>
+              <a:rPr lang="en-US"/>
               <a:t>Fourth level</a:t>
             </a:r>
           </a:p>
           <a:p>
             <a:pPr lvl="4"/>
             <a:r>
-              <a:rPr lang="en-US" smtClean="0"/>
+              <a:rPr lang="en-US"/>
               <a:t>Fifth level</a:t>
             </a:r>
             <a:endParaRPr lang="en-US" dirty="0"/>
@@ -1759,7 +1753,7 @@
             </a:pPr>
             <a:fld id="{D7E3C0B0-29AE-4239-85DA-537078CA2ABB}" type="datetime1">
               <a:rPr lang="en-US" altLang="zh-CN" smtClean="0"/>
-              <a:t>12/2/2018</a:t>
+              <a:t>12/3/2018</a:t>
             </a:fld>
             <a:endParaRPr lang="en-US"/>
           </a:p>
@@ -1788,10 +1782,9 @@
               <a:defRPr/>
             </a:pPr>
             <a:r>
-              <a:rPr lang="en-US" smtClean="0"/>
+              <a:rPr lang="en-US"/>
               <a:t>3D Trajactory Representation for Understanding Human Actions</a:t>
             </a:r>
-            <a:endParaRPr lang="en-US"/>
           </a:p>
         </p:txBody>
       </p:sp>
@@ -1874,7 +1867,7 @@
           <a:lstStyle/>
           <a:p>
             <a:r>
-              <a:rPr lang="en-US" smtClean="0"/>
+              <a:rPr lang="en-US"/>
               <a:t>Click to edit Master title style</a:t>
             </a:r>
             <a:endParaRPr lang="en-US" dirty="0"/>
@@ -1940,7 +1933,7 @@
           <a:p>
             <a:pPr lvl="0"/>
             <a:r>
-              <a:rPr lang="en-US" smtClean="0"/>
+              <a:rPr lang="en-US"/>
               <a:t>Click to edit Master text styles</a:t>
             </a:r>
           </a:p>
@@ -1968,35 +1961,35 @@
           <a:p>
             <a:pPr lvl="0"/>
             <a:r>
-              <a:rPr lang="en-US" smtClean="0"/>
+              <a:rPr lang="en-US"/>
               <a:t>Click to edit Master text styles</a:t>
             </a:r>
           </a:p>
           <a:p>
             <a:pPr lvl="1"/>
             <a:r>
-              <a:rPr lang="en-US" smtClean="0"/>
+              <a:rPr lang="en-US"/>
               <a:t>Second level</a:t>
             </a:r>
           </a:p>
           <a:p>
             <a:pPr lvl="2"/>
             <a:r>
-              <a:rPr lang="en-US" smtClean="0"/>
+              <a:rPr lang="en-US"/>
               <a:t>Third level</a:t>
             </a:r>
           </a:p>
           <a:p>
             <a:pPr lvl="3"/>
             <a:r>
-              <a:rPr lang="en-US" smtClean="0"/>
+              <a:rPr lang="en-US"/>
               <a:t>Fourth level</a:t>
             </a:r>
           </a:p>
           <a:p>
             <a:pPr lvl="4"/>
             <a:r>
-              <a:rPr lang="en-US" smtClean="0"/>
+              <a:rPr lang="en-US"/>
               <a:t>Fifth level</a:t>
             </a:r>
             <a:endParaRPr lang="en-US" dirty="0"/>
@@ -2062,7 +2055,7 @@
           <a:p>
             <a:pPr lvl="0"/>
             <a:r>
-              <a:rPr lang="en-US" smtClean="0"/>
+              <a:rPr lang="en-US"/>
               <a:t>Click to edit Master text styles</a:t>
             </a:r>
           </a:p>
@@ -2090,35 +2083,35 @@
           <a:p>
             <a:pPr lvl="0"/>
             <a:r>
-              <a:rPr lang="en-US" smtClean="0"/>
+              <a:rPr lang="en-US"/>
               <a:t>Click to edit Master text styles</a:t>
             </a:r>
           </a:p>
           <a:p>
             <a:pPr lvl="1"/>
             <a:r>
-              <a:rPr lang="en-US" smtClean="0"/>
+              <a:rPr lang="en-US"/>
               <a:t>Second level</a:t>
             </a:r>
           </a:p>
           <a:p>
             <a:pPr lvl="2"/>
             <a:r>
-              <a:rPr lang="en-US" smtClean="0"/>
+              <a:rPr lang="en-US"/>
               <a:t>Third level</a:t>
             </a:r>
           </a:p>
           <a:p>
             <a:pPr lvl="3"/>
             <a:r>
-              <a:rPr lang="en-US" smtClean="0"/>
+              <a:rPr lang="en-US"/>
               <a:t>Fourth level</a:t>
             </a:r>
           </a:p>
           <a:p>
             <a:pPr lvl="4"/>
             <a:r>
-              <a:rPr lang="en-US" smtClean="0"/>
+              <a:rPr lang="en-US"/>
               <a:t>Fifth level</a:t>
             </a:r>
             <a:endParaRPr lang="en-US" dirty="0"/>
@@ -2149,7 +2142,7 @@
             </a:pPr>
             <a:fld id="{F1A18534-C600-47A7-8089-4248B91E70A2}" type="datetime1">
               <a:rPr lang="en-US" altLang="zh-CN" smtClean="0"/>
-              <a:t>12/2/2018</a:t>
+              <a:t>12/3/2018</a:t>
             </a:fld>
             <a:endParaRPr lang="en-US"/>
           </a:p>
@@ -2178,10 +2171,9 @@
               <a:defRPr/>
             </a:pPr>
             <a:r>
-              <a:rPr lang="en-US" smtClean="0"/>
+              <a:rPr lang="en-US"/>
               <a:t>3D Trajactory Representation for Understanding Human Actions</a:t>
             </a:r>
-            <a:endParaRPr lang="en-US"/>
           </a:p>
         </p:txBody>
       </p:sp>
@@ -2259,7 +2251,7 @@
           <a:lstStyle/>
           <a:p>
             <a:r>
-              <a:rPr lang="en-US" smtClean="0"/>
+              <a:rPr lang="en-US"/>
               <a:t>Click to edit Master title style</a:t>
             </a:r>
             <a:endParaRPr lang="en-US" dirty="0"/>
@@ -2290,7 +2282,7 @@
             </a:pPr>
             <a:fld id="{5D328309-443F-4DA6-9F93-D82686B9CFC0}" type="datetime1">
               <a:rPr lang="en-US" altLang="zh-CN" smtClean="0"/>
-              <a:t>12/2/2018</a:t>
+              <a:t>12/3/2018</a:t>
             </a:fld>
             <a:endParaRPr lang="en-US"/>
           </a:p>
@@ -2319,10 +2311,9 @@
               <a:defRPr/>
             </a:pPr>
             <a:r>
-              <a:rPr lang="en-US" smtClean="0"/>
+              <a:rPr lang="en-US"/>
               <a:t>3D Trajactory Representation for Understanding Human Actions</a:t>
             </a:r>
-            <a:endParaRPr lang="en-US"/>
           </a:p>
         </p:txBody>
       </p:sp>
@@ -2408,7 +2399,7 @@
             </a:pPr>
             <a:fld id="{4E37F21F-A390-4E50-AE58-E293000A7172}" type="datetime1">
               <a:rPr lang="en-US" altLang="zh-CN" smtClean="0"/>
-              <a:t>12/2/2018</a:t>
+              <a:t>12/3/2018</a:t>
             </a:fld>
             <a:endParaRPr lang="en-US"/>
           </a:p>
@@ -2437,10 +2428,9 @@
               <a:defRPr/>
             </a:pPr>
             <a:r>
-              <a:rPr lang="en-US" smtClean="0"/>
+              <a:rPr lang="en-US"/>
               <a:t>3D Trajactory Representation for Understanding Human Actions</a:t>
             </a:r>
-            <a:endParaRPr lang="en-US"/>
           </a:p>
         </p:txBody>
       </p:sp>
@@ -2527,7 +2517,7 @@
           </a:lstStyle>
           <a:p>
             <a:r>
-              <a:rPr lang="en-US" smtClean="0"/>
+              <a:rPr lang="en-US"/>
               <a:t>Click to edit Master title style</a:t>
             </a:r>
             <a:endParaRPr lang="en-US" dirty="0"/>
@@ -2584,35 +2574,35 @@
           <a:p>
             <a:pPr lvl="0"/>
             <a:r>
-              <a:rPr lang="en-US" smtClean="0"/>
+              <a:rPr lang="en-US"/>
               <a:t>Click to edit Master text styles</a:t>
             </a:r>
           </a:p>
           <a:p>
             <a:pPr lvl="1"/>
             <a:r>
-              <a:rPr lang="en-US" smtClean="0"/>
+              <a:rPr lang="en-US"/>
               <a:t>Second level</a:t>
             </a:r>
           </a:p>
           <a:p>
             <a:pPr lvl="2"/>
             <a:r>
-              <a:rPr lang="en-US" smtClean="0"/>
+              <a:rPr lang="en-US"/>
               <a:t>Third level</a:t>
             </a:r>
           </a:p>
           <a:p>
             <a:pPr lvl="3"/>
             <a:r>
-              <a:rPr lang="en-US" smtClean="0"/>
+              <a:rPr lang="en-US"/>
               <a:t>Fourth level</a:t>
             </a:r>
           </a:p>
           <a:p>
             <a:pPr lvl="4"/>
             <a:r>
-              <a:rPr lang="en-US" smtClean="0"/>
+              <a:rPr lang="en-US"/>
               <a:t>Fifth level</a:t>
             </a:r>
             <a:endParaRPr lang="en-US" dirty="0"/>
@@ -2678,7 +2668,7 @@
           <a:p>
             <a:pPr lvl="0"/>
             <a:r>
-              <a:rPr lang="en-US" smtClean="0"/>
+              <a:rPr lang="en-US"/>
               <a:t>Click to edit Master text styles</a:t>
             </a:r>
           </a:p>
@@ -2708,7 +2698,7 @@
             </a:pPr>
             <a:fld id="{20EBEEAD-66D8-4B9B-9240-93849C5A697E}" type="datetime1">
               <a:rPr lang="en-US" altLang="zh-CN" smtClean="0"/>
-              <a:t>12/2/2018</a:t>
+              <a:t>12/3/2018</a:t>
             </a:fld>
             <a:endParaRPr lang="en-US"/>
           </a:p>
@@ -2737,10 +2727,9 @@
               <a:defRPr/>
             </a:pPr>
             <a:r>
-              <a:rPr lang="en-US" smtClean="0"/>
+              <a:rPr lang="en-US"/>
               <a:t>3D Trajactory Representation for Understanding Human Actions</a:t>
             </a:r>
-            <a:endParaRPr lang="en-US"/>
           </a:p>
         </p:txBody>
       </p:sp>
@@ -2827,7 +2816,7 @@
           </a:lstStyle>
           <a:p>
             <a:r>
-              <a:rPr lang="en-US" smtClean="0"/>
+              <a:rPr lang="en-US"/>
               <a:t>Click to edit Master title style</a:t>
             </a:r>
             <a:endParaRPr lang="en-US" dirty="0"/>
@@ -2895,7 +2884,7 @@
           <a:p>
             <a:pPr lvl="0"/>
             <a:r>
-              <a:rPr lang="en-US" noProof="0" smtClean="0"/>
+              <a:rPr lang="en-US" noProof="0"/>
               <a:t>Click icon to add picture</a:t>
             </a:r>
             <a:endParaRPr lang="en-US" noProof="0" dirty="0"/>
@@ -2961,7 +2950,7 @@
           <a:p>
             <a:pPr lvl="0"/>
             <a:r>
-              <a:rPr lang="en-US" smtClean="0"/>
+              <a:rPr lang="en-US"/>
               <a:t>Click to edit Master text styles</a:t>
             </a:r>
           </a:p>
@@ -2991,7 +2980,7 @@
             </a:pPr>
             <a:fld id="{B4DBBEE8-847E-4A1D-B1E4-660FF2219BBC}" type="datetime1">
               <a:rPr lang="en-US" altLang="zh-CN" smtClean="0"/>
-              <a:t>12/2/2018</a:t>
+              <a:t>12/3/2018</a:t>
             </a:fld>
             <a:endParaRPr lang="en-US"/>
           </a:p>
@@ -3020,10 +3009,9 @@
               <a:defRPr/>
             </a:pPr>
             <a:r>
-              <a:rPr lang="en-US" smtClean="0"/>
+              <a:rPr lang="en-US"/>
               <a:t>3D Trajactory Representation for Understanding Human Actions</a:t>
             </a:r>
-            <a:endParaRPr lang="en-US"/>
           </a:p>
         </p:txBody>
       </p:sp>
@@ -3126,7 +3114,7 @@
           <a:p>
             <a:pPr lvl="0"/>
             <a:r>
-              <a:rPr lang="en-US" smtClean="0"/>
+              <a:rPr lang="en-US"/>
               <a:t>Click to edit Master title style</a:t>
             </a:r>
           </a:p>
@@ -3168,35 +3156,35 @@
           <a:p>
             <a:pPr lvl="0"/>
             <a:r>
-              <a:rPr lang="en-US" smtClean="0"/>
+              <a:rPr lang="en-US"/>
               <a:t>Click to edit Master text styles</a:t>
             </a:r>
           </a:p>
           <a:p>
             <a:pPr lvl="1"/>
             <a:r>
-              <a:rPr lang="en-US" smtClean="0"/>
+              <a:rPr lang="en-US"/>
               <a:t>Second level</a:t>
             </a:r>
           </a:p>
           <a:p>
             <a:pPr lvl="2"/>
             <a:r>
-              <a:rPr lang="en-US" smtClean="0"/>
+              <a:rPr lang="en-US"/>
               <a:t>Third level</a:t>
             </a:r>
           </a:p>
           <a:p>
             <a:pPr lvl="3"/>
             <a:r>
-              <a:rPr lang="en-US" smtClean="0"/>
+              <a:rPr lang="en-US"/>
               <a:t>Fourth level</a:t>
             </a:r>
           </a:p>
           <a:p>
             <a:pPr lvl="4"/>
             <a:r>
-              <a:rPr lang="en-US" smtClean="0"/>
+              <a:rPr lang="en-US"/>
               <a:t>Fifth level</a:t>
             </a:r>
           </a:p>
@@ -3247,7 +3235,7 @@
             </a:pPr>
             <a:fld id="{19B319EC-E1EB-4B78-94E2-C9BAE5908773}" type="datetime1">
               <a:rPr lang="en-US" altLang="zh-CN" smtClean="0"/>
-              <a:t>12/2/2018</a:t>
+              <a:t>12/3/2018</a:t>
             </a:fld>
             <a:endParaRPr lang="en-US"/>
           </a:p>
@@ -3297,10 +3285,9 @@
               <a:defRPr/>
             </a:pPr>
             <a:r>
-              <a:rPr lang="en-US" smtClean="0"/>
+              <a:rPr lang="en-US"/>
               <a:t>3D Trajactory Representation for Understanding Human Actions</a:t>
             </a:r>
-            <a:endParaRPr lang="en-US"/>
           </a:p>
         </p:txBody>
       </p:sp>
@@ -3864,21 +3851,8 @@
                 <a:ea typeface="Adobe Arabic"/>
                 <a:cs typeface="Adobe Arabic"/>
               </a:rPr>
-              <a:t>#   </a:t>
-            </a:r>
-            <a:r>
-              <a:rPr lang="en-US" sz="9600" dirty="0" smtClean="0">
-                <a:latin typeface="Impact" pitchFamily="34" charset="0"/>
-                <a:ea typeface="Adobe Arabic"/>
-                <a:cs typeface="Adobe Arabic"/>
-              </a:rPr>
-              <a:t>21</a:t>
-            </a:r>
-            <a:endParaRPr lang="en-US" sz="9600" dirty="0">
-              <a:latin typeface="Impact" pitchFamily="34" charset="0"/>
-              <a:ea typeface="Adobe Arabic"/>
-              <a:cs typeface="Adobe Arabic"/>
-            </a:endParaRPr>
+              <a:t>#   21</a:t>
+            </a:r>
           </a:p>
         </p:txBody>
       </p:sp>
@@ -3913,29 +3887,23 @@
           <a:lstStyle/>
           <a:p>
             <a:r>
-              <a:rPr lang="en-US" sz="6000" dirty="0" err="1" smtClean="0">
+              <a:rPr lang="en-US" sz="6000" dirty="0" err="1">
                 <a:solidFill>
                   <a:srgbClr val="FFFF00"/>
                 </a:solidFill>
                 <a:latin typeface="Calibri" pitchFamily="34" charset="0"/>
               </a:rPr>
-              <a:t>Kenand</a:t>
-            </a:r>
-            <a:r>
-              <a:rPr lang="en-US" sz="6000" dirty="0" smtClean="0">
+              <a:t>kenand</a:t>
+            </a:r>
+            <a:r>
+              <a:rPr lang="en-US" sz="6000" dirty="0">
                 <a:solidFill>
                   <a:srgbClr val="FFFF00"/>
                 </a:solidFill>
                 <a:latin typeface="Calibri" pitchFamily="34" charset="0"/>
               </a:rPr>
-              <a:t>, Chunhui2</a:t>
-            </a:r>
-            <a:endParaRPr lang="en-US" sz="6000" dirty="0">
-              <a:solidFill>
-                <a:srgbClr val="FFFF00"/>
-              </a:solidFill>
-              <a:latin typeface="Calibri" pitchFamily="34" charset="0"/>
-            </a:endParaRPr>
+              <a:t>, chunhui2</a:t>
+            </a:r>
           </a:p>
         </p:txBody>
       </p:sp>
@@ -3944,13 +3912,6 @@
   <p:clrMapOvr>
     <a:masterClrMapping/>
   </p:clrMapOvr>
-  <p:timing>
-    <p:tnLst>
-      <p:par>
-        <p:cTn id="1" dur="indefinite" restart="never" nodeType="tmRoot"/>
-      </p:par>
-    </p:tnLst>
-  </p:timing>
 </p:sld>
 </file>
 
@@ -3981,45 +3942,22 @@
             <p:ph type="title"/>
           </p:nvPr>
         </p:nvSpPr>
-        <p:spPr/>
+        <p:spPr>
+          <a:xfrm>
+            <a:off x="478172" y="365125"/>
+            <a:ext cx="11316749" cy="1325563"/>
+          </a:xfrm>
+        </p:spPr>
         <p:txBody>
           <a:bodyPr/>
           <a:lstStyle/>
           <a:p>
-            <a:r>
-              <a:rPr lang="en-US" altLang="zh-CN" dirty="0" smtClean="0">
-                <a:latin typeface="Times New Roman" panose="02020603050405020304" pitchFamily="18" charset="0"/>
-                <a:cs typeface="Times New Roman" panose="02020603050405020304" pitchFamily="18" charset="0"/>
-              </a:rPr>
-              <a:t>Represent 3D </a:t>
-            </a:r>
             <a:r>
               <a:rPr lang="en-US" altLang="zh-CN" dirty="0">
                 <a:latin typeface="Times New Roman" panose="02020603050405020304" pitchFamily="18" charset="0"/>
                 <a:cs typeface="Times New Roman" panose="02020603050405020304" pitchFamily="18" charset="0"/>
               </a:rPr>
-              <a:t>Trajectory </a:t>
-            </a:r>
-            <a:r>
-              <a:rPr lang="en-US" altLang="zh-CN" dirty="0" smtClean="0">
-                <a:latin typeface="Times New Roman" panose="02020603050405020304" pitchFamily="18" charset="0"/>
-                <a:cs typeface="Times New Roman" panose="02020603050405020304" pitchFamily="18" charset="0"/>
-              </a:rPr>
-              <a:t>of </a:t>
-            </a:r>
-            <a:r>
-              <a:rPr lang="en-US" altLang="zh-CN" dirty="0">
-                <a:latin typeface="Times New Roman" panose="02020603050405020304" pitchFamily="18" charset="0"/>
-                <a:cs typeface="Times New Roman" panose="02020603050405020304" pitchFamily="18" charset="0"/>
-              </a:rPr>
-              <a:t>Human </a:t>
-            </a:r>
-            <a:r>
-              <a:rPr lang="en-US" altLang="zh-CN" dirty="0" smtClean="0">
-                <a:latin typeface="Times New Roman" panose="02020603050405020304" pitchFamily="18" charset="0"/>
-                <a:cs typeface="Times New Roman" panose="02020603050405020304" pitchFamily="18" charset="0"/>
-              </a:rPr>
-              <a:t>Actions</a:t>
+              <a:t>3D Trajectory Representations of Human Actions</a:t>
             </a:r>
             <a:endParaRPr lang="zh-CN" altLang="en-US" dirty="0"/>
           </a:p>
@@ -4050,7 +3988,7 @@
               <a:buChar char="Ø"/>
             </a:pPr>
             <a:r>
-              <a:rPr lang="en-US" altLang="zh-CN" sz="2000" b="1" u="sng" dirty="0" smtClean="0">
+              <a:rPr lang="en-US" altLang="zh-CN" sz="2000" b="1" u="sng" dirty="0">
                 <a:latin typeface="Times New Roman" panose="02020603050405020304" pitchFamily="18" charset="0"/>
                 <a:cs typeface="Times New Roman" panose="02020603050405020304" pitchFamily="18" charset="0"/>
               </a:rPr>
@@ -4069,28 +4007,7 @@
                 <a:latin typeface="Times New Roman" panose="02020603050405020304" pitchFamily="18" charset="0"/>
                 <a:cs typeface="Times New Roman" panose="02020603050405020304" pitchFamily="18" charset="0"/>
               </a:rPr>
-              <a:t>Skeleton </a:t>
-            </a:r>
-            <a:r>
-              <a:rPr lang="en-US" altLang="zh-CN" sz="1800" dirty="0" smtClean="0">
-                <a:latin typeface="Times New Roman" panose="02020603050405020304" pitchFamily="18" charset="0"/>
-                <a:cs typeface="Times New Roman" panose="02020603050405020304" pitchFamily="18" charset="0"/>
-              </a:rPr>
-              <a:t>data can provide comprehensive representations </a:t>
-            </a:r>
-            <a:r>
-              <a:rPr lang="en-US" altLang="zh-CN" sz="1800" dirty="0">
-                <a:latin typeface="Times New Roman" panose="02020603050405020304" pitchFamily="18" charset="0"/>
-                <a:cs typeface="Times New Roman" panose="02020603050405020304" pitchFamily="18" charset="0"/>
-              </a:rPr>
-              <a:t>of </a:t>
-            </a:r>
-            <a:r>
-              <a:rPr lang="en-US" altLang="zh-CN" sz="1800" dirty="0" smtClean="0">
-                <a:latin typeface="Times New Roman" panose="02020603050405020304" pitchFamily="18" charset="0"/>
-                <a:cs typeface="Times New Roman" panose="02020603050405020304" pitchFamily="18" charset="0"/>
-              </a:rPr>
-              <a:t>human body.</a:t>
+              <a:t>Skeleton data can provide comprehensive representations of human body</a:t>
             </a:r>
           </a:p>
           <a:p>
@@ -4101,19 +4018,15 @@
               <a:buSzPct val="150000"/>
             </a:pPr>
             <a:r>
-              <a:rPr lang="en-US" altLang="zh-CN" sz="1800" dirty="0" smtClean="0">
+              <a:rPr lang="en-US" altLang="zh-CN" sz="1800" dirty="0">
                 <a:latin typeface="Times New Roman" panose="02020603050405020304" pitchFamily="18" charset="0"/>
                 <a:cs typeface="Times New Roman" panose="02020603050405020304" pitchFamily="18" charset="0"/>
               </a:rPr>
               <a:t>How to find a function to represent actions?</a:t>
             </a:r>
-            <a:endParaRPr lang="en-US" altLang="zh-CN" sz="1800" dirty="0">
-              <a:latin typeface="Times New Roman" panose="02020603050405020304" pitchFamily="18" charset="0"/>
-              <a:cs typeface="Times New Roman" panose="02020603050405020304" pitchFamily="18" charset="0"/>
-            </a:endParaRPr>
-          </a:p>
-          <a:p>
-            <a:endParaRPr lang="en-US" altLang="zh-CN" sz="2000" dirty="0" smtClean="0">
+          </a:p>
+          <a:p>
+            <a:endParaRPr lang="en-US" altLang="zh-CN" sz="2000" dirty="0">
               <a:latin typeface="Times New Roman" panose="02020603050405020304" pitchFamily="18" charset="0"/>
               <a:cs typeface="Times New Roman" panose="02020603050405020304" pitchFamily="18" charset="0"/>
             </a:endParaRPr>
@@ -4153,16 +4066,12 @@
               <a:defRPr/>
             </a:pPr>
             <a:r>
-              <a:rPr lang="en-US" sz="1400" dirty="0" smtClean="0">
+              <a:rPr lang="en-US" sz="1400" dirty="0">
                 <a:latin typeface="Times New Roman" panose="02020603050405020304" pitchFamily="18" charset="0"/>
                 <a:cs typeface="Times New Roman" panose="02020603050405020304" pitchFamily="18" charset="0"/>
               </a:rPr>
               <a:t>Kenan Deng, Chunhui Liu: 3D Trajectory Representation for Understanding Human Actions</a:t>
             </a:r>
-            <a:endParaRPr lang="en-US" sz="1400" dirty="0">
-              <a:latin typeface="Times New Roman" panose="02020603050405020304" pitchFamily="18" charset="0"/>
-              <a:cs typeface="Times New Roman" panose="02020603050405020304" pitchFamily="18" charset="0"/>
-            </a:endParaRPr>
           </a:p>
         </p:txBody>
       </p:sp>
@@ -4410,11 +4319,11 @@
               <a:buChar char="Ø"/>
             </a:pPr>
             <a:r>
-              <a:rPr lang="en-US" altLang="zh-CN" sz="2000" b="1" u="sng" dirty="0" smtClean="0">
+              <a:rPr lang="en-US" altLang="zh-CN" sz="2000" b="1" u="sng" dirty="0">
                 <a:latin typeface="Times New Roman" panose="02020603050405020304" pitchFamily="18" charset="0"/>
                 <a:cs typeface="Times New Roman" panose="02020603050405020304" pitchFamily="18" charset="0"/>
               </a:rPr>
-              <a:t>Problem Define</a:t>
+              <a:t>Problem Definition</a:t>
             </a:r>
           </a:p>
           <a:p>
@@ -4425,11 +4334,11 @@
               <a:buSzPct val="150000"/>
             </a:pPr>
             <a:r>
-              <a:rPr lang="en-US" altLang="zh-CN" sz="1800" dirty="0" smtClean="0">
+              <a:rPr lang="en-US" altLang="zh-CN" sz="1800" dirty="0">
                 <a:latin typeface="Times New Roman" panose="02020603050405020304" pitchFamily="18" charset="0"/>
                 <a:cs typeface="Times New Roman" panose="02020603050405020304" pitchFamily="18" charset="0"/>
               </a:rPr>
-              <a:t>Given a set of action series of same label</a:t>
+              <a:t>Given a set of action series of the same label</a:t>
             </a:r>
           </a:p>
           <a:p>
@@ -4440,11 +4349,11 @@
               <a:buSzPct val="150000"/>
             </a:pPr>
             <a:r>
-              <a:rPr lang="en-US" altLang="zh-CN" sz="1800" dirty="0" smtClean="0">
+              <a:rPr lang="en-US" altLang="zh-CN" sz="1800" dirty="0">
                 <a:latin typeface="Times New Roman" panose="02020603050405020304" pitchFamily="18" charset="0"/>
                 <a:cs typeface="Times New Roman" panose="02020603050405020304" pitchFamily="18" charset="0"/>
               </a:rPr>
-              <a:t>Find a simple function to present trajectory of joints positions in this kind of action</a:t>
+              <a:t>Find a simple function to represent trajectory of joints positions for this given action</a:t>
             </a:r>
           </a:p>
           <a:p>
@@ -4454,7 +4363,7 @@
               </a:spcBef>
               <a:buSzPct val="150000"/>
             </a:pPr>
-            <a:endParaRPr lang="en-US" altLang="zh-CN" sz="500" dirty="0" smtClean="0">
+            <a:endParaRPr lang="en-US" altLang="zh-CN" sz="500" dirty="0">
               <a:latin typeface="Times New Roman" panose="02020603050405020304" pitchFamily="18" charset="0"/>
               <a:cs typeface="Times New Roman" panose="02020603050405020304" pitchFamily="18" charset="0"/>
             </a:endParaRPr>
@@ -4465,7 +4374,7 @@
               <a:buChar char="Ø"/>
             </a:pPr>
             <a:r>
-              <a:rPr lang="en-US" altLang="zh-CN" sz="2000" b="1" u="sng" dirty="0" smtClean="0">
+              <a:rPr lang="en-US" altLang="zh-CN" sz="2000" b="1" u="sng" dirty="0">
                 <a:latin typeface="Times New Roman" panose="02020603050405020304" pitchFamily="18" charset="0"/>
                 <a:cs typeface="Times New Roman" panose="02020603050405020304" pitchFamily="18" charset="0"/>
               </a:rPr>
@@ -4484,26 +4393,8 @@
                 <a:latin typeface="Times New Roman" panose="02020603050405020304" pitchFamily="18" charset="0"/>
                 <a:cs typeface="Times New Roman" panose="02020603050405020304" pitchFamily="18" charset="0"/>
               </a:rPr>
-              <a:t>With</a:t>
-            </a:r>
-            <a:r>
-              <a:rPr lang="en-US" altLang="zh-CN" sz="1800" dirty="0" smtClean="0">
-                <a:latin typeface="Times New Roman" panose="02020603050405020304" pitchFamily="18" charset="0"/>
-                <a:cs typeface="Times New Roman" panose="02020603050405020304" pitchFamily="18" charset="0"/>
-              </a:rPr>
-              <a:t> </a:t>
-            </a:r>
-            <a:r>
-              <a:rPr lang="en-US" altLang="zh-CN" sz="1800" dirty="0">
-                <a:latin typeface="Times New Roman" panose="02020603050405020304" pitchFamily="18" charset="0"/>
-                <a:cs typeface="Times New Roman" panose="02020603050405020304" pitchFamily="18" charset="0"/>
-              </a:rPr>
-              <a:t>a set of polynomial function basis</a:t>
-            </a:r>
-            <a:endParaRPr lang="en-US" altLang="zh-CN" sz="1800" dirty="0" smtClean="0">
-              <a:latin typeface="Times New Roman" panose="02020603050405020304" pitchFamily="18" charset="0"/>
-              <a:cs typeface="Times New Roman" panose="02020603050405020304" pitchFamily="18" charset="0"/>
-            </a:endParaRPr>
+              <a:t>Define a set of polynomial function basis</a:t>
+            </a:r>
           </a:p>
           <a:p>
             <a:pPr marL="228600" lvl="1">
@@ -4513,7 +4404,7 @@
               <a:buSzPct val="150000"/>
             </a:pPr>
             <a:r>
-              <a:rPr lang="en-US" altLang="zh-CN" sz="1800" dirty="0" smtClean="0">
+              <a:rPr lang="en-US" altLang="zh-CN" sz="1800" dirty="0">
                 <a:latin typeface="Times New Roman" panose="02020603050405020304" pitchFamily="18" charset="0"/>
                 <a:cs typeface="Times New Roman" panose="02020603050405020304" pitchFamily="18" charset="0"/>
               </a:rPr>
@@ -4527,7 +4418,7 @@
               </a:spcBef>
               <a:buSzPct val="150000"/>
             </a:pPr>
-            <a:endParaRPr lang="en-US" altLang="zh-CN" sz="500" dirty="0" smtClean="0">
+            <a:endParaRPr lang="en-US" altLang="zh-CN" sz="500" dirty="0">
               <a:latin typeface="Times New Roman" panose="02020603050405020304" pitchFamily="18" charset="0"/>
               <a:cs typeface="Times New Roman" panose="02020603050405020304" pitchFamily="18" charset="0"/>
             </a:endParaRPr>
@@ -4538,7 +4429,7 @@
               <a:buChar char="Ø"/>
             </a:pPr>
             <a:r>
-              <a:rPr lang="en-US" altLang="zh-CN" sz="2000" b="1" u="sng" dirty="0" smtClean="0">
+              <a:rPr lang="en-US" altLang="zh-CN" sz="2000" b="1" u="sng" dirty="0">
                 <a:latin typeface="Times New Roman" panose="02020603050405020304" pitchFamily="18" charset="0"/>
                 <a:cs typeface="Times New Roman" panose="02020603050405020304" pitchFamily="18" charset="0"/>
               </a:rPr>
@@ -4553,11 +4444,11 @@
               <a:buSzPct val="150000"/>
             </a:pPr>
             <a:r>
-              <a:rPr lang="en-US" altLang="zh-CN" sz="1800" dirty="0" smtClean="0">
+              <a:rPr lang="en-US" altLang="zh-CN" sz="1800" dirty="0">
                 <a:latin typeface="Times New Roman" panose="02020603050405020304" pitchFamily="18" charset="0"/>
                 <a:cs typeface="Times New Roman" panose="02020603050405020304" pitchFamily="18" charset="0"/>
               </a:rPr>
-              <a:t>Find a representative trajectory of a action</a:t>
+              <a:t>Find a representative trajectory of an action</a:t>
             </a:r>
           </a:p>
           <a:p>
@@ -4568,16 +4459,12 @@
               <a:buSzPct val="150000"/>
             </a:pPr>
             <a:r>
-              <a:rPr lang="en-US" altLang="zh-CN" sz="1800" dirty="0" smtClean="0">
+              <a:rPr lang="en-US" altLang="zh-CN" sz="1800" dirty="0">
                 <a:latin typeface="Times New Roman" panose="02020603050405020304" pitchFamily="18" charset="0"/>
                 <a:cs typeface="Times New Roman" panose="02020603050405020304" pitchFamily="18" charset="0"/>
               </a:rPr>
               <a:t>Merge trajectory to create new actions</a:t>
             </a:r>
-            <a:endParaRPr lang="en-US" altLang="zh-CN" sz="1800" dirty="0">
-              <a:latin typeface="Times New Roman" panose="02020603050405020304" pitchFamily="18" charset="0"/>
-              <a:cs typeface="Times New Roman" panose="02020603050405020304" pitchFamily="18" charset="0"/>
-            </a:endParaRPr>
           </a:p>
           <a:p>
             <a:pPr marL="228600" lvl="1">
@@ -4587,7 +4474,7 @@
               <a:buSzPct val="150000"/>
             </a:pPr>
             <a:r>
-              <a:rPr lang="en-US" altLang="zh-CN" sz="1800" dirty="0" smtClean="0">
+              <a:rPr lang="en-US" altLang="zh-CN" sz="1800" dirty="0">
                 <a:latin typeface="Times New Roman" panose="02020603050405020304" pitchFamily="18" charset="0"/>
                 <a:cs typeface="Times New Roman" panose="02020603050405020304" pitchFamily="18" charset="0"/>
               </a:rPr>
@@ -4631,13 +4518,6 @@
   <p:clrMapOvr>
     <a:masterClrMapping/>
   </p:clrMapOvr>
-  <p:timing>
-    <p:tnLst>
-      <p:par>
-        <p:cTn id="1" dur="indefinite" restart="never" nodeType="tmRoot"/>
-      </p:par>
-    </p:tnLst>
-  </p:timing>
 </p:sld>
 </file>
 
@@ -4674,7 +4554,7 @@
           <a:lstStyle/>
           <a:p>
             <a:r>
-              <a:rPr lang="en-US" altLang="zh-CN" dirty="0" smtClean="0">
+              <a:rPr lang="en-US" altLang="zh-CN" dirty="0">
                 <a:latin typeface="Times New Roman" panose="02020603050405020304" pitchFamily="18" charset="0"/>
                 <a:cs typeface="Times New Roman" panose="02020603050405020304" pitchFamily="18" charset="0"/>
               </a:rPr>
@@ -4684,8 +4564,8 @@
           </a:p>
         </p:txBody>
       </p:sp>
-      <mc:AlternateContent xmlns:mc="http://schemas.openxmlformats.org/markup-compatibility/2006">
-        <mc:Choice xmlns:a14="http://schemas.microsoft.com/office/drawing/2010/main" Requires="a14">
+      <mc:AlternateContent xmlns:mc="http://schemas.openxmlformats.org/markup-compatibility/2006" xmlns:a14="http://schemas.microsoft.com/office/drawing/2010/main">
+        <mc:Choice Requires="a14">
           <p:sp>
             <p:nvSpPr>
               <p:cNvPr id="3" name="内容占位符 2"/>
@@ -4699,7 +4579,7 @@
             <p:spPr>
               <a:xfrm>
                 <a:off x="802334" y="1512092"/>
-                <a:ext cx="4491990" cy="4351338"/>
+                <a:ext cx="4851706" cy="4351338"/>
               </a:xfrm>
             </p:spPr>
             <p:txBody>
@@ -4711,18 +4591,11 @@
                   <a:buChar char="Ø"/>
                 </a:pPr>
                 <a:r>
-                  <a:rPr lang="en-US" altLang="zh-CN" sz="2000" b="1" u="sng" dirty="0" smtClean="0">
-                    <a:latin typeface="Times New Roman" panose="02020603050405020304" pitchFamily="18" charset="0"/>
-                    <a:cs typeface="Times New Roman" panose="02020603050405020304" pitchFamily="18" charset="0"/>
-                  </a:rPr>
-                  <a:t>Technical </a:t>
-                </a:r>
-                <a:r>
                   <a:rPr lang="en-US" altLang="zh-CN" sz="2000" b="1" u="sng" dirty="0">
                     <a:latin typeface="Times New Roman" panose="02020603050405020304" pitchFamily="18" charset="0"/>
                     <a:cs typeface="Times New Roman" panose="02020603050405020304" pitchFamily="18" charset="0"/>
                   </a:rPr>
-                  <a:t>Details</a:t>
+                  <a:t>Technical Details</a:t>
                 </a:r>
               </a:p>
               <a:p>
@@ -4737,14 +4610,7 @@
                     <a:latin typeface="Times New Roman" panose="02020603050405020304" pitchFamily="18" charset="0"/>
                     <a:cs typeface="Times New Roman" panose="02020603050405020304" pitchFamily="18" charset="0"/>
                   </a:rPr>
-                  <a:t>Data </a:t>
-                </a:r>
-                <a:r>
-                  <a:rPr lang="en-US" altLang="zh-CN" sz="1800" dirty="0" smtClean="0">
-                    <a:latin typeface="Times New Roman" panose="02020603050405020304" pitchFamily="18" charset="0"/>
-                    <a:cs typeface="Times New Roman" panose="02020603050405020304" pitchFamily="18" charset="0"/>
-                  </a:rPr>
-                  <a:t>fitting: </a:t>
+                  <a:t>Data fitting: </a:t>
                 </a:r>
               </a:p>
               <a:p>
@@ -4756,18 +4622,11 @@
                   <a:buNone/>
                 </a:pPr>
                 <a:r>
-                  <a:rPr lang="en-US" altLang="zh-CN" sz="1800" dirty="0" smtClean="0">
-                    <a:latin typeface="Times New Roman" panose="02020603050405020304" pitchFamily="18" charset="0"/>
-                    <a:cs typeface="Times New Roman" panose="02020603050405020304" pitchFamily="18" charset="0"/>
-                  </a:rPr>
-                  <a:t>    joint </a:t>
-                </a:r>
-                <a:r>
                   <a:rPr lang="en-US" altLang="zh-CN" sz="1800" dirty="0">
                     <a:latin typeface="Times New Roman" panose="02020603050405020304" pitchFamily="18" charset="0"/>
                     <a:cs typeface="Times New Roman" panose="02020603050405020304" pitchFamily="18" charset="0"/>
                   </a:rPr>
-                  <a:t>position for time t: </a:t>
+                  <a:t>    joint position for time t: </a:t>
                 </a:r>
                 <a14:m>
                   <m:oMath xmlns:m="http://schemas.openxmlformats.org/officeDocument/2006/math">
@@ -4781,8 +4640,8 @@
                     <m:d>
                       <m:dPr>
                         <m:ctrlPr>
-                          <a:rPr lang="en-US" altLang="zh-CN" sz="1800">
-                            <a:latin typeface="Times New Roman" panose="02020603050405020304" pitchFamily="18" charset="0"/>
+                          <a:rPr lang="en-US" altLang="zh-CN" sz="1800" i="1">
+                            <a:latin typeface="Cambria Math" panose="02040503050406030204" pitchFamily="18" charset="0"/>
                             <a:cs typeface="Times New Roman" panose="02020603050405020304" pitchFamily="18" charset="0"/>
                           </a:rPr>
                         </m:ctrlPr>
@@ -4790,7 +4649,7 @@
                       <m:e>
                         <m:r>
                           <a:rPr lang="en-US" altLang="zh-CN" sz="1800">
-                            <a:latin typeface="Times New Roman" panose="02020603050405020304" pitchFamily="18" charset="0"/>
+                            <a:latin typeface="Cambria Math" panose="02040503050406030204" pitchFamily="18" charset="0"/>
                             <a:cs typeface="Times New Roman" panose="02020603050405020304" pitchFamily="18" charset="0"/>
                           </a:rPr>
                           <m:t>𝑡</m:t>
@@ -4799,7 +4658,7 @@
                     </m:d>
                     <m:r>
                       <a:rPr lang="en-US" altLang="zh-CN" sz="1800">
-                        <a:latin typeface="Times New Roman" panose="02020603050405020304" pitchFamily="18" charset="0"/>
+                        <a:latin typeface="Cambria Math" panose="02040503050406030204" pitchFamily="18" charset="0"/>
                         <a:cs typeface="Times New Roman" panose="02020603050405020304" pitchFamily="18" charset="0"/>
                       </a:rPr>
                       <m:t>∈</m:t>
@@ -4807,8 +4666,8 @@
                     <m:sSup>
                       <m:sSupPr>
                         <m:ctrlPr>
-                          <a:rPr lang="en-US" altLang="zh-CN" sz="1800">
-                            <a:latin typeface="Times New Roman" panose="02020603050405020304" pitchFamily="18" charset="0"/>
+                          <a:rPr lang="en-US" altLang="zh-CN" sz="1800" i="1">
+                            <a:latin typeface="Cambria Math" panose="02040503050406030204" pitchFamily="18" charset="0"/>
                             <a:cs typeface="Times New Roman" panose="02020603050405020304" pitchFamily="18" charset="0"/>
                           </a:rPr>
                         </m:ctrlPr>
@@ -4816,7 +4675,7 @@
                       <m:e>
                         <m:r>
                           <a:rPr lang="en-US" altLang="zh-CN" sz="1800">
-                            <a:latin typeface="Times New Roman" panose="02020603050405020304" pitchFamily="18" charset="0"/>
+                            <a:latin typeface="Cambria Math" panose="02040503050406030204" pitchFamily="18" charset="0"/>
                             <a:cs typeface="Times New Roman" panose="02020603050405020304" pitchFamily="18" charset="0"/>
                           </a:rPr>
                           <m:t>𝑅</m:t>
@@ -4825,7 +4684,7 @@
                       <m:sup>
                         <m:r>
                           <a:rPr lang="en-US" altLang="zh-CN" sz="1800">
-                            <a:latin typeface="Times New Roman" panose="02020603050405020304" pitchFamily="18" charset="0"/>
+                            <a:latin typeface="Cambria Math" panose="02040503050406030204" pitchFamily="18" charset="0"/>
                             <a:cs typeface="Times New Roman" panose="02020603050405020304" pitchFamily="18" charset="0"/>
                           </a:rPr>
                           <m:t>20×3</m:t>
@@ -4834,7 +4693,7 @@
                     </m:sSup>
                   </m:oMath>
                 </a14:m>
-                <a:endParaRPr lang="en-US" altLang="zh-CN" sz="1800" dirty="0" smtClean="0">
+                <a:endParaRPr lang="en-US" altLang="zh-CN" sz="1800" dirty="0">
                   <a:latin typeface="Times New Roman" panose="02020603050405020304" pitchFamily="18" charset="0"/>
                   <a:cs typeface="Times New Roman" panose="02020603050405020304" pitchFamily="18" charset="0"/>
                 </a:endParaRPr>
@@ -4852,14 +4711,7 @@
                     <a:latin typeface="Times New Roman" panose="02020603050405020304" pitchFamily="18" charset="0"/>
                     <a:cs typeface="Times New Roman" panose="02020603050405020304" pitchFamily="18" charset="0"/>
                   </a:rPr>
-                  <a:t> </a:t>
-                </a:r>
-                <a:r>
-                  <a:rPr lang="en-US" altLang="zh-CN" sz="1800" dirty="0" smtClean="0">
-                    <a:latin typeface="Times New Roman" panose="02020603050405020304" pitchFamily="18" charset="0"/>
-                    <a:cs typeface="Times New Roman" panose="02020603050405020304" pitchFamily="18" charset="0"/>
-                  </a:rPr>
-                  <a:t>   we got n samples </a:t>
+                  <a:t>    we got n samples </a:t>
                 </a:r>
                 <a14:m>
                   <m:oMath xmlns:m="http://schemas.openxmlformats.org/officeDocument/2006/math">
@@ -5020,7 +4872,7 @@
                     </m:d>
                   </m:oMath>
                 </a14:m>
-                <a:endParaRPr lang="en-US" altLang="zh-CN" sz="1800" dirty="0" smtClean="0">
+                <a:endParaRPr lang="en-US" altLang="zh-CN" sz="1800" dirty="0">
                   <a:latin typeface="Times New Roman" panose="02020603050405020304" pitchFamily="18" charset="0"/>
                   <a:cs typeface="Times New Roman" panose="02020603050405020304" pitchFamily="18" charset="0"/>
                 </a:endParaRPr>
@@ -5198,7 +5050,7 @@
                     </m:d>
                   </m:oMath>
                 </a14:m>
-                <a:endParaRPr lang="en-US" altLang="zh-CN" sz="1800" dirty="0" smtClean="0">
+                <a:endParaRPr lang="en-US" altLang="zh-CN" sz="1800" dirty="0">
                   <a:latin typeface="Times New Roman" panose="02020603050405020304" pitchFamily="18" charset="0"/>
                   <a:cs typeface="Times New Roman" panose="02020603050405020304" pitchFamily="18" charset="0"/>
                 </a:endParaRPr>
@@ -5442,7 +5294,7 @@
                     </m:r>
                   </m:oMath>
                 </a14:m>
-                <a:endParaRPr lang="en-US" altLang="zh-CN" sz="1800" dirty="0" smtClean="0">
+                <a:endParaRPr lang="en-US" altLang="zh-CN" sz="1800" dirty="0">
                   <a:latin typeface="Times New Roman" panose="02020603050405020304" pitchFamily="18" charset="0"/>
                   <a:cs typeface="Times New Roman" panose="02020603050405020304" pitchFamily="18" charset="0"/>
                 </a:endParaRPr>
@@ -5454,7 +5306,7 @@
                   </a:spcBef>
                   <a:buSzPct val="150000"/>
                 </a:pPr>
-                <a:endParaRPr lang="en-US" altLang="zh-CN" sz="1050" dirty="0" smtClean="0">
+                <a:endParaRPr lang="en-US" altLang="zh-CN" sz="1050" dirty="0">
                   <a:latin typeface="Times New Roman" panose="02020603050405020304" pitchFamily="18" charset="0"/>
                   <a:cs typeface="Times New Roman" panose="02020603050405020304" pitchFamily="18" charset="0"/>
                 </a:endParaRPr>
@@ -5465,30 +5317,11 @@
                   <a:buChar char="Ø"/>
                 </a:pPr>
                 <a:r>
-                  <a:rPr lang="en-US" altLang="zh-CN" sz="2000" b="1" u="sng" dirty="0" smtClean="0">
+                  <a:rPr lang="en-US" altLang="zh-CN" sz="2000" b="1" u="sng" dirty="0">
                     <a:latin typeface="Times New Roman" panose="02020603050405020304" pitchFamily="18" charset="0"/>
                     <a:cs typeface="Times New Roman" panose="02020603050405020304" pitchFamily="18" charset="0"/>
                   </a:rPr>
                   <a:t>Data Preprocess</a:t>
-                </a:r>
-                <a:endParaRPr lang="en-US" altLang="zh-CN" sz="2000" b="1" u="sng" dirty="0">
-                  <a:latin typeface="Times New Roman" panose="02020603050405020304" pitchFamily="18" charset="0"/>
-                  <a:cs typeface="Times New Roman" panose="02020603050405020304" pitchFamily="18" charset="0"/>
-                </a:endParaRPr>
-              </a:p>
-              <a:p>
-                <a:pPr marL="228600" lvl="1">
-                  <a:spcBef>
-                    <a:spcPts val="1000"/>
-                  </a:spcBef>
-                  <a:buSzPct val="150000"/>
-                </a:pPr>
-                <a:r>
-                  <a:rPr lang="en-US" altLang="zh-CN" sz="1800" dirty="0" smtClean="0">
-                    <a:latin typeface="Times New Roman" panose="02020603050405020304" pitchFamily="18" charset="0"/>
-                    <a:cs typeface="Times New Roman" panose="02020603050405020304" pitchFamily="18" charset="0"/>
-                  </a:rPr>
-                  <a:t>Interpolate all action to 100 frames</a:t>
                 </a:r>
               </a:p>
               <a:p>
@@ -5499,11 +5332,11 @@
                   <a:buSzPct val="150000"/>
                 </a:pPr>
                 <a:r>
-                  <a:rPr lang="en-US" altLang="zh-CN" sz="1800" dirty="0" smtClean="0">
+                  <a:rPr lang="en-US" altLang="zh-CN" sz="1800" dirty="0">
                     <a:latin typeface="Times New Roman" panose="02020603050405020304" pitchFamily="18" charset="0"/>
                     <a:cs typeface="Times New Roman" panose="02020603050405020304" pitchFamily="18" charset="0"/>
                   </a:rPr>
-                  <a:t>Length Normalization</a:t>
+                  <a:t>Align all actions to 100 frames by interpolation</a:t>
                 </a:r>
               </a:p>
               <a:p>
@@ -5514,7 +5347,22 @@
                   <a:buSzPct val="150000"/>
                 </a:pPr>
                 <a:r>
-                  <a:rPr lang="en-US" altLang="zh-CN" sz="1800" dirty="0" smtClean="0">
+                  <a:rPr lang="en-US" altLang="zh-CN" sz="1800" dirty="0">
+                    <a:latin typeface="Times New Roman" panose="02020603050405020304" pitchFamily="18" charset="0"/>
+                    <a:cs typeface="Times New Roman" panose="02020603050405020304" pitchFamily="18" charset="0"/>
+                  </a:rPr>
+                  <a:t>Normalize bone length</a:t>
+                </a:r>
+              </a:p>
+              <a:p>
+                <a:pPr marL="228600" lvl="1">
+                  <a:spcBef>
+                    <a:spcPts val="1000"/>
+                  </a:spcBef>
+                  <a:buSzPct val="150000"/>
+                </a:pPr>
+                <a:r>
+                  <a:rPr lang="en-US" altLang="zh-CN" sz="1800" dirty="0">
                     <a:latin typeface="Times New Roman" panose="02020603050405020304" pitchFamily="18" charset="0"/>
                     <a:cs typeface="Times New Roman" panose="02020603050405020304" pitchFamily="18" charset="0"/>
                   </a:rPr>
@@ -5529,16 +5377,12 @@
                   <a:buSzPct val="150000"/>
                 </a:pPr>
                 <a:r>
-                  <a:rPr lang="en-US" altLang="zh-CN" sz="1800" dirty="0" smtClean="0">
+                  <a:rPr lang="en-US" altLang="zh-CN" sz="1800" dirty="0">
                     <a:latin typeface="Times New Roman" panose="02020603050405020304" pitchFamily="18" charset="0"/>
                     <a:cs typeface="Times New Roman" panose="02020603050405020304" pitchFamily="18" charset="0"/>
                   </a:rPr>
-                  <a:t>Fit the derivation of joints</a:t>
+                  <a:t>Fit the forward difference of joint locations</a:t>
                 </a:r>
-                <a:endParaRPr lang="en-US" altLang="zh-CN" sz="1800" dirty="0">
-                  <a:latin typeface="Times New Roman" panose="02020603050405020304" pitchFamily="18" charset="0"/>
-                  <a:cs typeface="Times New Roman" panose="02020603050405020304" pitchFamily="18" charset="0"/>
-                </a:endParaRPr>
               </a:p>
               <a:p>
                 <a:pPr marL="0" lvl="1" indent="0">
@@ -5553,19 +5397,8 @@
                     <a:latin typeface="Times New Roman" panose="02020603050405020304" pitchFamily="18" charset="0"/>
                     <a:cs typeface="Times New Roman" panose="02020603050405020304" pitchFamily="18" charset="0"/>
                   </a:rPr>
-                  <a:t> </a:t>
+                  <a:t>    </a:t>
                 </a:r>
-                <a:r>
-                  <a:rPr lang="en-US" altLang="zh-CN" sz="1800" dirty="0">
-                    <a:latin typeface="Times New Roman" panose="02020603050405020304" pitchFamily="18" charset="0"/>
-                    <a:cs typeface="Times New Roman" panose="02020603050405020304" pitchFamily="18" charset="0"/>
-                  </a:rPr>
-                  <a:t>   </a:t>
-                </a:r>
-                <a:endParaRPr lang="en-US" altLang="zh-CN" sz="1800" dirty="0">
-                  <a:latin typeface="Times New Roman" panose="02020603050405020304" pitchFamily="18" charset="0"/>
-                  <a:cs typeface="Times New Roman" panose="02020603050405020304" pitchFamily="18" charset="0"/>
-                </a:endParaRPr>
               </a:p>
               <a:p>
                 <a:endParaRPr lang="zh-CN" altLang="en-US" sz="1800" dirty="0">
@@ -5576,7 +5409,7 @@
             </p:txBody>
           </p:sp>
         </mc:Choice>
-        <mc:Fallback>
+        <mc:Fallback xmlns="">
           <p:sp>
             <p:nvSpPr>
               <p:cNvPr id="3" name="内容占位符 2"/>
@@ -5590,12 +5423,12 @@
             <p:spPr>
               <a:xfrm>
                 <a:off x="802334" y="1512092"/>
-                <a:ext cx="4491990" cy="4351338"/>
+                <a:ext cx="4851706" cy="4351338"/>
               </a:xfrm>
               <a:blipFill>
                 <a:blip r:embed="rId2"/>
                 <a:stretch>
-                  <a:fillRect l="-2310" t="-1401" b="-7843"/>
+                  <a:fillRect l="-2136" t="-1401" b="-7703"/>
                 </a:stretch>
               </a:blipFill>
             </p:spPr>
@@ -5604,7 +5437,7 @@
               <a:lstStyle/>
               <a:p>
                 <a:r>
-                  <a:rPr lang="zh-CN" altLang="en-US">
+                  <a:rPr lang="en-CA">
                     <a:noFill/>
                   </a:rPr>
                   <a:t> </a:t>
@@ -5638,16 +5471,12 @@
               <a:defRPr/>
             </a:pPr>
             <a:r>
-              <a:rPr lang="en-US" sz="1400" dirty="0" smtClean="0">
+              <a:rPr lang="en-US" sz="1400" dirty="0">
                 <a:latin typeface="Times New Roman" panose="02020603050405020304" pitchFamily="18" charset="0"/>
                 <a:cs typeface="Times New Roman" panose="02020603050405020304" pitchFamily="18" charset="0"/>
               </a:rPr>
               <a:t>Kenan Deng, Chunhui Liu: 3D Trajectory Representation for Understanding Human Actions</a:t>
             </a:r>
-            <a:endParaRPr lang="en-US" sz="1400" dirty="0">
-              <a:latin typeface="Times New Roman" panose="02020603050405020304" pitchFamily="18" charset="0"/>
-              <a:cs typeface="Times New Roman" panose="02020603050405020304" pitchFamily="18" charset="0"/>
-            </a:endParaRPr>
           </a:p>
         </p:txBody>
       </p:sp>
@@ -5895,16 +5724,12 @@
               <a:buChar char="Ø"/>
             </a:pPr>
             <a:r>
-              <a:rPr lang="en-US" altLang="zh-CN" sz="2000" b="1" u="sng" dirty="0" smtClean="0">
+              <a:rPr lang="en-US" altLang="zh-CN" sz="2000" b="1" u="sng" dirty="0">
                 <a:latin typeface="Times New Roman" panose="02020603050405020304" pitchFamily="18" charset="0"/>
                 <a:cs typeface="Times New Roman" panose="02020603050405020304" pitchFamily="18" charset="0"/>
               </a:rPr>
               <a:t>Generation Results</a:t>
             </a:r>
-            <a:endParaRPr lang="en-US" altLang="zh-CN" sz="2000" b="1" u="sng" dirty="0">
-              <a:latin typeface="Times New Roman" panose="02020603050405020304" pitchFamily="18" charset="0"/>
-              <a:cs typeface="Times New Roman" panose="02020603050405020304" pitchFamily="18" charset="0"/>
-            </a:endParaRPr>
           </a:p>
           <a:p>
             <a:pPr marL="0" lvl="1" indent="0">
@@ -5956,7 +5781,7 @@
               <a:buSzPct val="150000"/>
               <a:buNone/>
             </a:pPr>
-            <a:endParaRPr lang="en-US" altLang="zh-CN" sz="1400" dirty="0" smtClean="0">
+            <a:endParaRPr lang="en-US" altLang="zh-CN" sz="1400" dirty="0">
               <a:latin typeface="Times New Roman" panose="02020603050405020304" pitchFamily="18" charset="0"/>
               <a:cs typeface="Times New Roman" panose="02020603050405020304" pitchFamily="18" charset="0"/>
             </a:endParaRPr>
@@ -5987,42 +5812,7 @@
                 <a:latin typeface="Times New Roman" panose="02020603050405020304" pitchFamily="18" charset="0"/>
                 <a:cs typeface="Times New Roman" panose="02020603050405020304" pitchFamily="18" charset="0"/>
               </a:rPr>
-              <a:t>      </a:t>
-            </a:r>
-            <a:r>
-              <a:rPr lang="en-US" altLang="zh-CN" sz="1800" dirty="0" smtClean="0">
-                <a:latin typeface="Times New Roman" panose="02020603050405020304" pitchFamily="18" charset="0"/>
-                <a:cs typeface="Times New Roman" panose="02020603050405020304" pitchFamily="18" charset="0"/>
-              </a:rPr>
-              <a:t>       High </a:t>
-            </a:r>
-            <a:r>
-              <a:rPr lang="en-US" altLang="zh-CN" sz="1800" dirty="0">
-                <a:latin typeface="Times New Roman" panose="02020603050405020304" pitchFamily="18" charset="0"/>
-                <a:cs typeface="Times New Roman" panose="02020603050405020304" pitchFamily="18" charset="0"/>
-              </a:rPr>
-              <a:t>Arm Wave                  </a:t>
-            </a:r>
-            <a:r>
-              <a:rPr lang="en-US" altLang="zh-CN" sz="1800" dirty="0" smtClean="0">
-                <a:latin typeface="Times New Roman" panose="02020603050405020304" pitchFamily="18" charset="0"/>
-                <a:cs typeface="Times New Roman" panose="02020603050405020304" pitchFamily="18" charset="0"/>
-              </a:rPr>
-              <a:t>                </a:t>
-            </a:r>
-            <a:r>
-              <a:rPr lang="en-US" altLang="zh-CN" sz="1800" dirty="0">
-                <a:latin typeface="Times New Roman" panose="02020603050405020304" pitchFamily="18" charset="0"/>
-                <a:cs typeface="Times New Roman" panose="02020603050405020304" pitchFamily="18" charset="0"/>
-              </a:rPr>
-              <a:t>Tow Hands </a:t>
-            </a:r>
-            <a:r>
-              <a:rPr lang="en-US" altLang="zh-CN" sz="1800" dirty="0" smtClean="0">
-                <a:latin typeface="Times New Roman" panose="02020603050405020304" pitchFamily="18" charset="0"/>
-                <a:cs typeface="Times New Roman" panose="02020603050405020304" pitchFamily="18" charset="0"/>
-              </a:rPr>
-              <a:t>Wave</a:t>
+              <a:t>             High Arm Wave                                  Tow Hands Wave</a:t>
             </a:r>
             <a:endParaRPr lang="en-US" altLang="zh-CN" sz="2000" b="1" u="sng" dirty="0">
               <a:latin typeface="Times New Roman" panose="02020603050405020304" pitchFamily="18" charset="0"/>
@@ -6064,29 +5854,8 @@
                 <a:latin typeface="Times New Roman" panose="02020603050405020304" pitchFamily="18" charset="0"/>
                 <a:cs typeface="Times New Roman" panose="02020603050405020304" pitchFamily="18" charset="0"/>
               </a:rPr>
-              <a:t>    MSR-action-3D (20 </a:t>
-            </a:r>
-            <a:r>
-              <a:rPr lang="en-US" altLang="zh-CN" sz="1800" dirty="0" smtClean="0">
-                <a:latin typeface="Times New Roman" panose="02020603050405020304" pitchFamily="18" charset="0"/>
-                <a:cs typeface="Times New Roman" panose="02020603050405020304" pitchFamily="18" charset="0"/>
-              </a:rPr>
-              <a:t>classes)</a:t>
-            </a:r>
-            <a:endParaRPr lang="en-US" altLang="zh-CN" sz="1800" dirty="0">
-              <a:latin typeface="Times New Roman" panose="02020603050405020304" pitchFamily="18" charset="0"/>
-              <a:cs typeface="Times New Roman" panose="02020603050405020304" pitchFamily="18" charset="0"/>
-            </a:endParaRPr>
-          </a:p>
-          <a:p>
-            <a:pPr>
-              <a:buFont typeface="Wingdings" panose="05000000000000000000" pitchFamily="2" charset="2"/>
-              <a:buChar char="Ø"/>
-            </a:pPr>
-            <a:endParaRPr lang="en-US" altLang="zh-CN" sz="2000" b="1" u="sng" dirty="0" smtClean="0">
-              <a:latin typeface="Times New Roman" panose="02020603050405020304" pitchFamily="18" charset="0"/>
-              <a:cs typeface="Times New Roman" panose="02020603050405020304" pitchFamily="18" charset="0"/>
-            </a:endParaRPr>
+              <a:t>    MSR-action-3D (20 classes)</a:t>
+            </a:r>
           </a:p>
           <a:p>
             <a:pPr>
@@ -6103,7 +5872,7 @@
               <a:buFont typeface="Wingdings" panose="05000000000000000000" pitchFamily="2" charset="2"/>
               <a:buChar char="Ø"/>
             </a:pPr>
-            <a:endParaRPr lang="en-US" altLang="zh-CN" sz="2000" b="1" u="sng" dirty="0" smtClean="0">
+            <a:endParaRPr lang="en-US" altLang="zh-CN" sz="2000" b="1" u="sng" dirty="0">
               <a:latin typeface="Times New Roman" panose="02020603050405020304" pitchFamily="18" charset="0"/>
               <a:cs typeface="Times New Roman" panose="02020603050405020304" pitchFamily="18" charset="0"/>
             </a:endParaRPr>
@@ -6113,7 +5882,7 @@
               <a:buFont typeface="Wingdings" panose="05000000000000000000" pitchFamily="2" charset="2"/>
               <a:buChar char="Ø"/>
             </a:pPr>
-            <a:endParaRPr lang="en-US" altLang="zh-CN" sz="700" b="1" u="sng" dirty="0" smtClean="0">
+            <a:endParaRPr lang="en-US" altLang="zh-CN" sz="2000" b="1" u="sng" dirty="0">
               <a:latin typeface="Times New Roman" panose="02020603050405020304" pitchFamily="18" charset="0"/>
               <a:cs typeface="Times New Roman" panose="02020603050405020304" pitchFamily="18" charset="0"/>
             </a:endParaRPr>
@@ -6123,8 +5892,18 @@
               <a:buFont typeface="Wingdings" panose="05000000000000000000" pitchFamily="2" charset="2"/>
               <a:buChar char="Ø"/>
             </a:pPr>
-            <a:r>
-              <a:rPr lang="en-US" altLang="zh-CN" sz="2000" b="1" u="sng" dirty="0" smtClean="0">
+            <a:endParaRPr lang="en-US" altLang="zh-CN" sz="700" b="1" u="sng" dirty="0">
+              <a:latin typeface="Times New Roman" panose="02020603050405020304" pitchFamily="18" charset="0"/>
+              <a:cs typeface="Times New Roman" panose="02020603050405020304" pitchFamily="18" charset="0"/>
+            </a:endParaRPr>
+          </a:p>
+          <a:p>
+            <a:pPr>
+              <a:buFont typeface="Wingdings" panose="05000000000000000000" pitchFamily="2" charset="2"/>
+              <a:buChar char="Ø"/>
+            </a:pPr>
+            <a:r>
+              <a:rPr lang="en-US" altLang="zh-CN" sz="2000" b="1" u="sng" dirty="0">
                 <a:latin typeface="Times New Roman" panose="02020603050405020304" pitchFamily="18" charset="0"/>
                 <a:cs typeface="Times New Roman" panose="02020603050405020304" pitchFamily="18" charset="0"/>
               </a:rPr>
@@ -6139,16 +5918,12 @@
               <a:buSzPct val="150000"/>
             </a:pPr>
             <a:r>
-              <a:rPr lang="en-US" altLang="zh-CN" sz="1800" dirty="0" smtClean="0">
+              <a:rPr lang="en-US" altLang="zh-CN" sz="1800" dirty="0">
                 <a:latin typeface="Times New Roman" panose="02020603050405020304" pitchFamily="18" charset="0"/>
                 <a:cs typeface="Times New Roman" panose="02020603050405020304" pitchFamily="18" charset="0"/>
               </a:rPr>
               <a:t>clap, kick, wave</a:t>
             </a:r>
-            <a:endParaRPr lang="en-US" altLang="zh-CN" sz="1800" dirty="0">
-              <a:latin typeface="Times New Roman" panose="02020603050405020304" pitchFamily="18" charset="0"/>
-              <a:cs typeface="Times New Roman" panose="02020603050405020304" pitchFamily="18" charset="0"/>
-            </a:endParaRPr>
           </a:p>
           <a:p>
             <a:pPr marL="0" lvl="1" indent="0">
@@ -6158,7 +5933,7 @@
               <a:buSzPct val="150000"/>
               <a:buNone/>
             </a:pPr>
-            <a:endParaRPr lang="en-US" altLang="zh-CN" sz="1800" dirty="0" smtClean="0">
+            <a:endParaRPr lang="en-US" altLang="zh-CN" sz="1800" dirty="0">
               <a:latin typeface="Times New Roman" panose="02020603050405020304" pitchFamily="18" charset="0"/>
               <a:cs typeface="Times New Roman" panose="02020603050405020304" pitchFamily="18" charset="0"/>
             </a:endParaRPr>
@@ -6171,7 +5946,7 @@
               <a:buSzPct val="150000"/>
               <a:buNone/>
             </a:pPr>
-            <a:endParaRPr lang="en-US" altLang="zh-CN" sz="1800" dirty="0" smtClean="0">
+            <a:endParaRPr lang="en-US" altLang="zh-CN" sz="1800" dirty="0">
               <a:latin typeface="Times New Roman" panose="02020603050405020304" pitchFamily="18" charset="0"/>
               <a:cs typeface="Times New Roman" panose="02020603050405020304" pitchFamily="18" charset="0"/>
             </a:endParaRPr>
@@ -6185,16 +5960,12 @@
               <a:buNone/>
             </a:pPr>
             <a:r>
-              <a:rPr lang="en-US" altLang="zh-CN" sz="1800" dirty="0" smtClean="0">
+              <a:rPr lang="en-US" altLang="zh-CN" sz="1800" dirty="0">
                 <a:latin typeface="Times New Roman" panose="02020603050405020304" pitchFamily="18" charset="0"/>
                 <a:cs typeface="Times New Roman" panose="02020603050405020304" pitchFamily="18" charset="0"/>
               </a:rPr>
               <a:t>    </a:t>
             </a:r>
-            <a:endParaRPr lang="en-US" altLang="zh-CN" sz="1800" dirty="0">
-              <a:latin typeface="Times New Roman" panose="02020603050405020304" pitchFamily="18" charset="0"/>
-              <a:cs typeface="Times New Roman" panose="02020603050405020304" pitchFamily="18" charset="0"/>
-            </a:endParaRPr>
           </a:p>
           <a:p>
             <a:pPr marL="0" lvl="1" indent="0">
@@ -6392,7 +6163,7 @@
                     <a:p>
                       <a:pPr algn="ctr"/>
                       <a:r>
-                        <a:rPr lang="en-US" altLang="zh-CN" sz="1600" dirty="0" smtClean="0">
+                        <a:rPr lang="en-US" altLang="zh-CN" sz="1600" dirty="0">
                           <a:latin typeface="Times New Roman" panose="02020603050405020304" pitchFamily="18" charset="0"/>
                           <a:cs typeface="Times New Roman" panose="02020603050405020304" pitchFamily="18" charset="0"/>
                         </a:rPr>
@@ -6413,7 +6184,7 @@
                     <a:p>
                       <a:pPr algn="ctr"/>
                       <a:r>
-                        <a:rPr lang="en-US" altLang="zh-CN" sz="1600" dirty="0" smtClean="0">
+                        <a:rPr lang="en-US" altLang="zh-CN" sz="1600" dirty="0">
                           <a:latin typeface="Times New Roman" panose="02020603050405020304" pitchFamily="18" charset="0"/>
                           <a:cs typeface="Times New Roman" panose="02020603050405020304" pitchFamily="18" charset="0"/>
                         </a:rPr>
@@ -6441,7 +6212,7 @@
                     <a:p>
                       <a:pPr algn="ctr"/>
                       <a:r>
-                        <a:rPr lang="en-US" altLang="zh-CN" sz="1600" dirty="0" smtClean="0">
+                        <a:rPr lang="en-US" altLang="zh-CN" sz="1600" dirty="0">
                           <a:latin typeface="Times New Roman" panose="02020603050405020304" pitchFamily="18" charset="0"/>
                           <a:cs typeface="Times New Roman" panose="02020603050405020304" pitchFamily="18" charset="0"/>
                         </a:rPr>
@@ -6462,7 +6233,7 @@
                     <a:p>
                       <a:pPr algn="ctr"/>
                       <a:r>
-                        <a:rPr lang="en-US" altLang="zh-CN" sz="1600" dirty="0" smtClean="0">
+                        <a:rPr lang="en-US" altLang="zh-CN" sz="1600" dirty="0">
                           <a:latin typeface="Times New Roman" panose="02020603050405020304" pitchFamily="18" charset="0"/>
                           <a:cs typeface="Times New Roman" panose="02020603050405020304" pitchFamily="18" charset="0"/>
                         </a:rPr>
@@ -6490,7 +6261,7 @@
                     <a:p>
                       <a:pPr algn="ctr"/>
                       <a:r>
-                        <a:rPr lang="en-US" altLang="zh-CN" sz="1600" dirty="0" smtClean="0">
+                        <a:rPr lang="en-US" altLang="zh-CN" sz="1600" dirty="0">
                           <a:latin typeface="Times New Roman" panose="02020603050405020304" pitchFamily="18" charset="0"/>
                           <a:cs typeface="Times New Roman" panose="02020603050405020304" pitchFamily="18" charset="0"/>
                         </a:rPr>
@@ -6527,13 +6298,13 @@
                         <a:defRPr/>
                       </a:pPr>
                       <a:r>
-                        <a:rPr lang="en-US" altLang="zh-CN" sz="1600" dirty="0" smtClean="0">
+                        <a:rPr lang="en-US" altLang="zh-CN" sz="1600" dirty="0">
                           <a:latin typeface="Times New Roman" panose="02020603050405020304" pitchFamily="18" charset="0"/>
                           <a:cs typeface="Times New Roman" panose="02020603050405020304" pitchFamily="18" charset="0"/>
                         </a:rPr>
                         <a:t>53.0%</a:t>
                       </a:r>
-                      <a:endParaRPr lang="zh-CN" altLang="en-US" sz="1600" dirty="0" smtClean="0">
+                      <a:endParaRPr lang="zh-CN" altLang="en-US" sz="1600" dirty="0">
                         <a:latin typeface="Times New Roman" panose="02020603050405020304" pitchFamily="18" charset="0"/>
                         <a:cs typeface="Times New Roman" panose="02020603050405020304" pitchFamily="18" charset="0"/>
                       </a:endParaRPr>
@@ -6555,7 +6326,7 @@
                     <a:p>
                       <a:pPr algn="ctr"/>
                       <a:r>
-                        <a:rPr lang="en-US" altLang="zh-CN" sz="1600" dirty="0" smtClean="0">
+                        <a:rPr lang="en-US" altLang="zh-CN" sz="1600" dirty="0">
                           <a:latin typeface="Times New Roman" panose="02020603050405020304" pitchFamily="18" charset="0"/>
                           <a:cs typeface="Times New Roman" panose="02020603050405020304" pitchFamily="18" charset="0"/>
                         </a:rPr>
@@ -6592,13 +6363,13 @@
                         <a:defRPr/>
                       </a:pPr>
                       <a:r>
-                        <a:rPr lang="en-US" altLang="zh-CN" sz="1600" dirty="0" smtClean="0">
+                        <a:rPr lang="en-US" altLang="zh-CN" sz="1600" dirty="0">
                           <a:latin typeface="Times New Roman" panose="02020603050405020304" pitchFamily="18" charset="0"/>
                           <a:cs typeface="Times New Roman" panose="02020603050405020304" pitchFamily="18" charset="0"/>
                         </a:rPr>
                         <a:t>61.0%</a:t>
                       </a:r>
-                      <a:endParaRPr lang="zh-CN" altLang="en-US" sz="1600" dirty="0" smtClean="0">
+                      <a:endParaRPr lang="zh-CN" altLang="en-US" sz="1600" dirty="0">
                         <a:latin typeface="Times New Roman" panose="02020603050405020304" pitchFamily="18" charset="0"/>
                         <a:cs typeface="Times New Roman" panose="02020603050405020304" pitchFamily="18" charset="0"/>
                       </a:endParaRPr>
@@ -6713,13 +6484,6 @@
   <p:clrMapOvr>
     <a:masterClrMapping/>
   </p:clrMapOvr>
-  <p:timing>
-    <p:tnLst>
-      <p:par>
-        <p:cTn id="1" dur="indefinite" restart="never" nodeType="tmRoot"/>
-      </p:par>
-    </p:tnLst>
-  </p:timing>
 </p:sld>
 </file>
 

</xml_diff>